<commit_message>
mod pptx e for rec_support
</commit_message>
<xml_diff>
--- a/docs/Presentazione.pptx
+++ b/docs/Presentazione.pptx
@@ -12530,7 +12530,7 @@
         </p:nvSpPr>
         <p:spPr>
           <a:xfrm rot="2720395">
-            <a:off x="594414" y="3990714"/>
+            <a:off x="3416066" y="4396529"/>
             <a:ext cx="360000" cy="360000"/>
           </a:xfrm>
           <a:prstGeom prst="teardrop">
@@ -12583,7 +12583,7 @@
         </p:nvSpPr>
         <p:spPr>
           <a:xfrm rot="2720395">
-            <a:off x="599328" y="3063064"/>
+            <a:off x="3420980" y="3468879"/>
             <a:ext cx="360000" cy="360000"/>
           </a:xfrm>
           <a:prstGeom prst="teardrop">
@@ -12636,7 +12636,7 @@
         </p:nvSpPr>
         <p:spPr>
           <a:xfrm rot="2720395">
-            <a:off x="594414" y="2133183"/>
+            <a:off x="3416066" y="2538998"/>
             <a:ext cx="360000" cy="360000"/>
           </a:xfrm>
           <a:prstGeom prst="teardrop">
@@ -12689,7 +12689,7 @@
         </p:nvSpPr>
         <p:spPr>
           <a:xfrm rot="2720395">
-            <a:off x="594413" y="1203301"/>
+            <a:off x="3416065" y="1609116"/>
             <a:ext cx="360000" cy="360000"/>
           </a:xfrm>
           <a:prstGeom prst="teardrop">
@@ -12742,7 +12742,7 @@
         </p:nvSpPr>
         <p:spPr>
           <a:xfrm>
-            <a:off x="3341511" y="241450"/>
+            <a:off x="3341511" y="243369"/>
             <a:ext cx="5508978" cy="769441"/>
           </a:xfrm>
           <a:prstGeom prst="rect">
@@ -12777,7 +12777,7 @@
         </p:nvSpPr>
         <p:spPr>
           <a:xfrm>
-            <a:off x="974128" y="1010891"/>
+            <a:off x="3795780" y="1416706"/>
             <a:ext cx="5256123" cy="929485"/>
           </a:xfrm>
           <a:prstGeom prst="rect">
@@ -13228,7 +13228,7 @@
         </p:nvSpPr>
         <p:spPr>
           <a:xfrm>
-            <a:off x="974128" y="1936619"/>
+            <a:off x="3795780" y="2342434"/>
             <a:ext cx="5256123" cy="929485"/>
           </a:xfrm>
           <a:prstGeom prst="rect">
@@ -13264,7 +13264,25 @@
                 </a:solidFill>
                 <a:latin typeface="Candara" panose="020E0502030303020204" pitchFamily="34" charset="0"/>
               </a:rPr>
-              <a:t> actual support</a:t>
+              <a:t> </a:t>
+            </a:r>
+            <a:r>
+              <a:rPr lang="en-US" sz="1600" b="1" dirty="0" err="1">
+                <a:solidFill>
+                  <a:srgbClr val="189A80"/>
+                </a:solidFill>
+                <a:latin typeface="Candara" panose="020E0502030303020204" pitchFamily="34" charset="0"/>
+              </a:rPr>
+              <a:t>cardinalità</a:t>
+            </a:r>
+            <a:r>
+              <a:rPr lang="en-US" sz="1600" b="1" dirty="0">
+                <a:solidFill>
+                  <a:srgbClr val="189A80"/>
+                </a:solidFill>
+                <a:latin typeface="Candara" panose="020E0502030303020204" pitchFamily="34" charset="0"/>
+              </a:rPr>
+              <a:t> F ed actual support</a:t>
             </a:r>
             <a:endParaRPr lang="en-US" sz="1600" b="1" dirty="0">
               <a:solidFill>
@@ -13748,7 +13766,7 @@
         </p:nvSpPr>
         <p:spPr>
           <a:xfrm>
-            <a:off x="974127" y="2871864"/>
+            <a:off x="3795779" y="3277679"/>
             <a:ext cx="5256123" cy="744819"/>
           </a:xfrm>
           <a:prstGeom prst="rect">
@@ -13993,7 +14011,7 @@
         </p:nvSpPr>
         <p:spPr>
           <a:xfrm>
-            <a:off x="974127" y="3797592"/>
+            <a:off x="3795779" y="4203407"/>
             <a:ext cx="5256123" cy="929485"/>
           </a:xfrm>
           <a:prstGeom prst="rect">
@@ -14510,7 +14528,7 @@
         </p:nvSpPr>
         <p:spPr>
           <a:xfrm rot="2720395">
-            <a:off x="594413" y="4859277"/>
+            <a:off x="3416065" y="5265092"/>
             <a:ext cx="360000" cy="360000"/>
           </a:xfrm>
           <a:prstGeom prst="teardrop">
@@ -14569,7 +14587,7 @@
         </p:nvSpPr>
         <p:spPr>
           <a:xfrm>
-            <a:off x="974126" y="4666155"/>
+            <a:off x="3795778" y="5071970"/>
             <a:ext cx="5256123" cy="744819"/>
           </a:xfrm>
           <a:prstGeom prst="rect">
@@ -15751,7 +15769,7 @@
         </p:nvSpPr>
         <p:spPr>
           <a:xfrm rot="2720395">
-            <a:off x="594414" y="3990714"/>
+            <a:off x="3416066" y="4395570"/>
             <a:ext cx="360000" cy="360000"/>
           </a:xfrm>
           <a:prstGeom prst="teardrop">
@@ -15804,7 +15822,7 @@
         </p:nvSpPr>
         <p:spPr>
           <a:xfrm rot="2720395">
-            <a:off x="599328" y="3063064"/>
+            <a:off x="3420980" y="3467920"/>
             <a:ext cx="360000" cy="360000"/>
           </a:xfrm>
           <a:prstGeom prst="teardrop">
@@ -15857,7 +15875,7 @@
         </p:nvSpPr>
         <p:spPr>
           <a:xfrm rot="2720395">
-            <a:off x="594414" y="2133183"/>
+            <a:off x="3416066" y="2538039"/>
             <a:ext cx="360000" cy="360000"/>
           </a:xfrm>
           <a:prstGeom prst="teardrop">
@@ -15910,7 +15928,7 @@
         </p:nvSpPr>
         <p:spPr>
           <a:xfrm rot="2720395">
-            <a:off x="594413" y="1203301"/>
+            <a:off x="3416065" y="1608157"/>
             <a:ext cx="360000" cy="360000"/>
           </a:xfrm>
           <a:prstGeom prst="teardrop">
@@ -15998,7 +16016,7 @@
         </p:nvSpPr>
         <p:spPr>
           <a:xfrm>
-            <a:off x="974128" y="1010891"/>
+            <a:off x="3795780" y="1415747"/>
             <a:ext cx="5256123" cy="744819"/>
           </a:xfrm>
           <a:prstGeom prst="rect">
@@ -16405,7 +16423,479 @@
         </p:nvSpPr>
         <p:spPr>
           <a:xfrm>
-            <a:off x="974128" y="1936619"/>
+            <a:off x="3795780" y="2341475"/>
+            <a:ext cx="5256123" cy="929485"/>
+          </a:xfrm>
+          <a:prstGeom prst="rect">
+            <a:avLst/>
+          </a:prstGeom>
+          <a:noFill/>
+        </p:spPr>
+        <p:txBody>
+          <a:bodyPr wrap="square" rtlCol="0">
+            <a:spAutoFit/>
+          </a:bodyPr>
+          <a:lstStyle/>
+          <a:p>
+            <a:pPr algn="ctr" defTabSz="1219170">
+              <a:spcBef>
+                <a:spcPct val="20000"/>
+              </a:spcBef>
+              <a:defRPr/>
+            </a:pPr>
+            <a:r>
+              <a:rPr lang="en-US" sz="1600" b="1" dirty="0" err="1">
+                <a:solidFill>
+                  <a:srgbClr val="189A80"/>
+                </a:solidFill>
+                <a:latin typeface="Candara" panose="020E0502030303020204" pitchFamily="34" charset="0"/>
+              </a:rPr>
+              <a:t>Calcolo</a:t>
+            </a:r>
+            <a:r>
+              <a:rPr lang="en-US" sz="1600" b="1" dirty="0">
+                <a:solidFill>
+                  <a:srgbClr val="189A80"/>
+                </a:solidFill>
+                <a:latin typeface="Candara" panose="020E0502030303020204" pitchFamily="34" charset="0"/>
+              </a:rPr>
+              <a:t> </a:t>
+            </a:r>
+            <a:r>
+              <a:rPr lang="en-US" sz="1600" b="1" dirty="0" err="1">
+                <a:solidFill>
+                  <a:srgbClr val="189A80"/>
+                </a:solidFill>
+                <a:latin typeface="Candara" panose="020E0502030303020204" pitchFamily="34" charset="0"/>
+              </a:rPr>
+              <a:t>cardinalità</a:t>
+            </a:r>
+            <a:r>
+              <a:rPr lang="en-US" sz="1600" b="1" dirty="0">
+                <a:solidFill>
+                  <a:srgbClr val="189A80"/>
+                </a:solidFill>
+                <a:latin typeface="Candara" panose="020E0502030303020204" pitchFamily="34" charset="0"/>
+              </a:rPr>
+              <a:t> F ed actual support</a:t>
+            </a:r>
+            <a:endParaRPr lang="en-US" sz="1600" b="1" dirty="0">
+              <a:solidFill>
+                <a:srgbClr val="34738D"/>
+              </a:solidFill>
+              <a:latin typeface="Candara" panose="020E0502030303020204" pitchFamily="34" charset="0"/>
+            </a:endParaRPr>
+          </a:p>
+          <a:p>
+            <a:pPr algn="ctr" defTabSz="1219170">
+              <a:spcBef>
+                <a:spcPct val="20000"/>
+              </a:spcBef>
+              <a:defRPr/>
+            </a:pPr>
+            <a:r>
+              <a:rPr lang="en-US" sz="1200" dirty="0">
+                <a:solidFill>
+                  <a:schemeClr val="bg2">
+                    <a:lumMod val="10000"/>
+                  </a:schemeClr>
+                </a:solidFill>
+                <a:latin typeface="Candara" panose="020E0502030303020204" pitchFamily="34" charset="0"/>
+              </a:rPr>
+              <a:t>Il </a:t>
+            </a:r>
+            <a:r>
+              <a:rPr lang="en-US" sz="1200" dirty="0" err="1">
+                <a:solidFill>
+                  <a:schemeClr val="bg2">
+                    <a:lumMod val="10000"/>
+                  </a:schemeClr>
+                </a:solidFill>
+                <a:latin typeface="Candara" panose="020E0502030303020204" pitchFamily="34" charset="0"/>
+              </a:rPr>
+              <a:t>calcolo</a:t>
+            </a:r>
+            <a:r>
+              <a:rPr lang="en-US" sz="1200" dirty="0">
+                <a:solidFill>
+                  <a:schemeClr val="bg2">
+                    <a:lumMod val="10000"/>
+                  </a:schemeClr>
+                </a:solidFill>
+                <a:latin typeface="Candara" panose="020E0502030303020204" pitchFamily="34" charset="0"/>
+              </a:rPr>
+              <a:t> del support error non </a:t>
+            </a:r>
+            <a:r>
+              <a:rPr lang="en-US" sz="1200" dirty="0" err="1">
+                <a:solidFill>
+                  <a:schemeClr val="bg2">
+                    <a:lumMod val="10000"/>
+                  </a:schemeClr>
+                </a:solidFill>
+                <a:latin typeface="Candara" panose="020E0502030303020204" pitchFamily="34" charset="0"/>
+              </a:rPr>
+              <a:t>viene</a:t>
+            </a:r>
+            <a:r>
+              <a:rPr lang="en-US" sz="1200" dirty="0">
+                <a:solidFill>
+                  <a:schemeClr val="bg2">
+                    <a:lumMod val="10000"/>
+                  </a:schemeClr>
+                </a:solidFill>
+                <a:latin typeface="Candara" panose="020E0502030303020204" pitchFamily="34" charset="0"/>
+              </a:rPr>
+              <a:t> </a:t>
+            </a:r>
+            <a:r>
+              <a:rPr lang="en-US" sz="1200" dirty="0" err="1">
+                <a:solidFill>
+                  <a:schemeClr val="bg2">
+                    <a:lumMod val="10000"/>
+                  </a:schemeClr>
+                </a:solidFill>
+                <a:latin typeface="Candara" panose="020E0502030303020204" pitchFamily="34" charset="0"/>
+              </a:rPr>
+              <a:t>aggiornato</a:t>
+            </a:r>
+            <a:r>
+              <a:rPr lang="en-US" sz="1200" dirty="0">
+                <a:solidFill>
+                  <a:schemeClr val="bg2">
+                    <a:lumMod val="10000"/>
+                  </a:schemeClr>
+                </a:solidFill>
+                <a:latin typeface="Candara" panose="020E0502030303020204" pitchFamily="34" charset="0"/>
+              </a:rPr>
+              <a:t> per </a:t>
+            </a:r>
+            <a:r>
+              <a:rPr lang="en-US" sz="1200" dirty="0" err="1">
+                <a:solidFill>
+                  <a:schemeClr val="bg2">
+                    <a:lumMod val="10000"/>
+                  </a:schemeClr>
+                </a:solidFill>
+                <a:latin typeface="Candara" panose="020E0502030303020204" pitchFamily="34" charset="0"/>
+              </a:rPr>
+              <a:t>evitare</a:t>
+            </a:r>
+            <a:r>
+              <a:rPr lang="en-US" sz="1200" dirty="0">
+                <a:solidFill>
+                  <a:schemeClr val="bg2">
+                    <a:lumMod val="10000"/>
+                  </a:schemeClr>
+                </a:solidFill>
+                <a:latin typeface="Candara" panose="020E0502030303020204" pitchFamily="34" charset="0"/>
+              </a:rPr>
+              <a:t> una </a:t>
+            </a:r>
+            <a:r>
+              <a:rPr lang="en-US" sz="1200" dirty="0" err="1">
+                <a:solidFill>
+                  <a:schemeClr val="bg2">
+                    <a:lumMod val="10000"/>
+                  </a:schemeClr>
+                </a:solidFill>
+                <a:latin typeface="Candara" panose="020E0502030303020204" pitchFamily="34" charset="0"/>
+              </a:rPr>
+              <a:t>divisione</a:t>
+            </a:r>
+            <a:r>
+              <a:rPr lang="en-US" sz="1200" dirty="0">
+                <a:solidFill>
+                  <a:schemeClr val="bg2">
+                    <a:lumMod val="10000"/>
+                  </a:schemeClr>
+                </a:solidFill>
+                <a:latin typeface="Candara" panose="020E0502030303020204" pitchFamily="34" charset="0"/>
+              </a:rPr>
+              <a:t> per zero. F </a:t>
+            </a:r>
+            <a:r>
+              <a:rPr lang="en-US" sz="1200" dirty="0" err="1">
+                <a:solidFill>
+                  <a:schemeClr val="bg2">
+                    <a:lumMod val="10000"/>
+                  </a:schemeClr>
+                </a:solidFill>
+                <a:latin typeface="Candara" panose="020E0502030303020204" pitchFamily="34" charset="0"/>
+              </a:rPr>
+              <a:t>invece</a:t>
+            </a:r>
+            <a:r>
+              <a:rPr lang="en-US" sz="1200" dirty="0">
+                <a:solidFill>
+                  <a:schemeClr val="bg2">
+                    <a:lumMod val="10000"/>
+                  </a:schemeClr>
+                </a:solidFill>
+                <a:latin typeface="Candara" panose="020E0502030303020204" pitchFamily="34" charset="0"/>
+              </a:rPr>
+              <a:t> </a:t>
+            </a:r>
+            <a:r>
+              <a:rPr lang="en-US" sz="1200" dirty="0" err="1">
+                <a:solidFill>
+                  <a:schemeClr val="bg2">
+                    <a:lumMod val="10000"/>
+                  </a:schemeClr>
+                </a:solidFill>
+                <a:latin typeface="Candara" panose="020E0502030303020204" pitchFamily="34" charset="0"/>
+              </a:rPr>
+              <a:t>viene</a:t>
+            </a:r>
+            <a:r>
+              <a:rPr lang="en-US" sz="1200" dirty="0">
+                <a:solidFill>
+                  <a:schemeClr val="bg2">
+                    <a:lumMod val="10000"/>
+                  </a:schemeClr>
+                </a:solidFill>
+                <a:latin typeface="Candara" panose="020E0502030303020204" pitchFamily="34" charset="0"/>
+              </a:rPr>
+              <a:t> </a:t>
+            </a:r>
+            <a:r>
+              <a:rPr lang="en-US" sz="1200" dirty="0" err="1">
+                <a:solidFill>
+                  <a:schemeClr val="bg2">
+                    <a:lumMod val="10000"/>
+                  </a:schemeClr>
+                </a:solidFill>
+                <a:latin typeface="Candara" panose="020E0502030303020204" pitchFamily="34" charset="0"/>
+              </a:rPr>
+              <a:t>settata</a:t>
+            </a:r>
+            <a:r>
+              <a:rPr lang="en-US" sz="1200" dirty="0">
+                <a:solidFill>
+                  <a:schemeClr val="bg2">
+                    <a:lumMod val="10000"/>
+                  </a:schemeClr>
+                </a:solidFill>
+                <a:latin typeface="Candara" panose="020E0502030303020204" pitchFamily="34" charset="0"/>
+              </a:rPr>
+              <a:t> a -1 per </a:t>
+            </a:r>
+            <a:r>
+              <a:rPr lang="en-US" sz="1200" dirty="0" err="1">
+                <a:solidFill>
+                  <a:schemeClr val="bg2">
+                    <a:lumMod val="10000"/>
+                  </a:schemeClr>
+                </a:solidFill>
+                <a:latin typeface="Candara" panose="020E0502030303020204" pitchFamily="34" charset="0"/>
+              </a:rPr>
+              <a:t>evidenziare</a:t>
+            </a:r>
+            <a:r>
+              <a:rPr lang="en-US" sz="1200" dirty="0">
+                <a:solidFill>
+                  <a:schemeClr val="bg2">
+                    <a:lumMod val="10000"/>
+                  </a:schemeClr>
+                </a:solidFill>
+                <a:latin typeface="Candara" panose="020E0502030303020204" pitchFamily="34" charset="0"/>
+              </a:rPr>
+              <a:t> </a:t>
+            </a:r>
+            <a:r>
+              <a:rPr lang="en-US" sz="1200" dirty="0" err="1">
+                <a:solidFill>
+                  <a:schemeClr val="bg2">
+                    <a:lumMod val="10000"/>
+                  </a:schemeClr>
+                </a:solidFill>
+                <a:latin typeface="Candara" panose="020E0502030303020204" pitchFamily="34" charset="0"/>
+              </a:rPr>
+              <a:t>il</a:t>
+            </a:r>
+            <a:r>
+              <a:rPr lang="en-US" sz="1200" dirty="0">
+                <a:solidFill>
+                  <a:schemeClr val="bg2">
+                    <a:lumMod val="10000"/>
+                  </a:schemeClr>
+                </a:solidFill>
+                <a:latin typeface="Candara" panose="020E0502030303020204" pitchFamily="34" charset="0"/>
+              </a:rPr>
+              <a:t> </a:t>
+            </a:r>
+            <a:r>
+              <a:rPr lang="en-US" sz="1200" dirty="0" err="1">
+                <a:solidFill>
+                  <a:schemeClr val="bg2">
+                    <a:lumMod val="10000"/>
+                  </a:schemeClr>
+                </a:solidFill>
+                <a:latin typeface="Candara" panose="020E0502030303020204" pitchFamily="34" charset="0"/>
+              </a:rPr>
+              <a:t>fatto</a:t>
+            </a:r>
+            <a:r>
+              <a:rPr lang="en-US" sz="1200" dirty="0">
+                <a:solidFill>
+                  <a:schemeClr val="bg2">
+                    <a:lumMod val="10000"/>
+                  </a:schemeClr>
+                </a:solidFill>
+                <a:latin typeface="Candara" panose="020E0502030303020204" pitchFamily="34" charset="0"/>
+              </a:rPr>
+              <a:t> </a:t>
+            </a:r>
+            <a:r>
+              <a:rPr lang="en-US" sz="1200" dirty="0" err="1">
+                <a:solidFill>
+                  <a:schemeClr val="bg2">
+                    <a:lumMod val="10000"/>
+                  </a:schemeClr>
+                </a:solidFill>
+                <a:latin typeface="Candara" panose="020E0502030303020204" pitchFamily="34" charset="0"/>
+              </a:rPr>
+              <a:t>che</a:t>
+            </a:r>
+            <a:r>
+              <a:rPr lang="en-US" sz="1200" dirty="0">
+                <a:solidFill>
+                  <a:schemeClr val="bg2">
+                    <a:lumMod val="10000"/>
+                  </a:schemeClr>
+                </a:solidFill>
+                <a:latin typeface="Candara" panose="020E0502030303020204" pitchFamily="34" charset="0"/>
+              </a:rPr>
+              <a:t> la </a:t>
+            </a:r>
+            <a:r>
+              <a:rPr lang="en-US" sz="1200" dirty="0" err="1">
+                <a:solidFill>
+                  <a:schemeClr val="bg2">
+                    <a:lumMod val="10000"/>
+                  </a:schemeClr>
+                </a:solidFill>
+                <a:latin typeface="Candara" panose="020E0502030303020204" pitchFamily="34" charset="0"/>
+              </a:rPr>
+              <a:t>cardinalità</a:t>
+            </a:r>
+            <a:r>
+              <a:rPr lang="en-US" sz="1200" dirty="0">
+                <a:solidFill>
+                  <a:schemeClr val="bg2">
+                    <a:lumMod val="10000"/>
+                  </a:schemeClr>
+                </a:solidFill>
+                <a:latin typeface="Candara" panose="020E0502030303020204" pitchFamily="34" charset="0"/>
+              </a:rPr>
+              <a:t> </a:t>
+            </a:r>
+            <a:r>
+              <a:rPr lang="en-US" sz="1200" dirty="0" err="1">
+                <a:solidFill>
+                  <a:schemeClr val="bg2">
+                    <a:lumMod val="10000"/>
+                  </a:schemeClr>
+                </a:solidFill>
+                <a:latin typeface="Candara" panose="020E0502030303020204" pitchFamily="34" charset="0"/>
+              </a:rPr>
+              <a:t>sia</a:t>
+            </a:r>
+            <a:r>
+              <a:rPr lang="en-US" sz="1200" dirty="0">
+                <a:solidFill>
+                  <a:schemeClr val="bg2">
+                    <a:lumMod val="10000"/>
+                  </a:schemeClr>
+                </a:solidFill>
+                <a:latin typeface="Candara" panose="020E0502030303020204" pitchFamily="34" charset="0"/>
+              </a:rPr>
+              <a:t> </a:t>
+            </a:r>
+            <a:r>
+              <a:rPr lang="en-US" sz="1200" dirty="0" err="1">
+                <a:solidFill>
+                  <a:schemeClr val="bg2">
+                    <a:lumMod val="10000"/>
+                  </a:schemeClr>
+                </a:solidFill>
+                <a:latin typeface="Candara" panose="020E0502030303020204" pitchFamily="34" charset="0"/>
+              </a:rPr>
+              <a:t>uguale</a:t>
+            </a:r>
+            <a:r>
+              <a:rPr lang="en-US" sz="1200" dirty="0">
+                <a:solidFill>
+                  <a:schemeClr val="bg2">
+                    <a:lumMod val="10000"/>
+                  </a:schemeClr>
+                </a:solidFill>
+                <a:latin typeface="Candara" panose="020E0502030303020204" pitchFamily="34" charset="0"/>
+              </a:rPr>
+              <a:t> a zero ed </a:t>
+            </a:r>
+            <a:r>
+              <a:rPr lang="en-US" sz="1200" dirty="0" err="1">
+                <a:solidFill>
+                  <a:schemeClr val="bg2">
+                    <a:lumMod val="10000"/>
+                  </a:schemeClr>
+                </a:solidFill>
+                <a:latin typeface="Candara" panose="020E0502030303020204" pitchFamily="34" charset="0"/>
+              </a:rPr>
+              <a:t>evitare</a:t>
+            </a:r>
+            <a:r>
+              <a:rPr lang="en-US" sz="1200" dirty="0">
+                <a:solidFill>
+                  <a:schemeClr val="bg2">
+                    <a:lumMod val="10000"/>
+                  </a:schemeClr>
+                </a:solidFill>
+                <a:latin typeface="Candara" panose="020E0502030303020204" pitchFamily="34" charset="0"/>
+              </a:rPr>
+              <a:t> una </a:t>
+            </a:r>
+            <a:r>
+              <a:rPr lang="en-US" sz="1200" dirty="0" err="1">
+                <a:solidFill>
+                  <a:schemeClr val="bg2">
+                    <a:lumMod val="10000"/>
+                  </a:schemeClr>
+                </a:solidFill>
+                <a:latin typeface="Candara" panose="020E0502030303020204" pitchFamily="34" charset="0"/>
+              </a:rPr>
+              <a:t>divisione</a:t>
+            </a:r>
+            <a:r>
+              <a:rPr lang="en-US" sz="1200" dirty="0">
+                <a:solidFill>
+                  <a:schemeClr val="bg2">
+                    <a:lumMod val="10000"/>
+                  </a:schemeClr>
+                </a:solidFill>
+                <a:latin typeface="Candara" panose="020E0502030303020204" pitchFamily="34" charset="0"/>
+              </a:rPr>
+              <a:t> per zero.</a:t>
+            </a:r>
+          </a:p>
+        </p:txBody>
+      </p:sp>
+      <p:sp>
+        <p:nvSpPr>
+          <p:cNvPr id="14" name="TextBox 25">
+            <a:extLst>
+              <a:ext uri="{FF2B5EF4-FFF2-40B4-BE49-F238E27FC236}">
+                <a16:creationId xmlns:a16="http://schemas.microsoft.com/office/drawing/2014/main" id="{0D4C3E5F-90E6-465D-B735-6FEC71763A9B}"/>
+              </a:ext>
+            </a:extLst>
+          </p:cNvPr>
+          <p:cNvSpPr txBox="1"/>
+          <p:nvPr/>
+        </p:nvSpPr>
+        <p:spPr>
+          <a:xfrm>
+            <a:off x="3795779" y="3276720"/>
             <a:ext cx="5256123" cy="744819"/>
           </a:xfrm>
           <a:prstGeom prst="rect">
@@ -16426,196 +16916,6 @@
               <a:defRPr/>
             </a:pPr>
             <a:r>
-              <a:rPr lang="en-US" sz="1600" b="1" dirty="0" err="1">
-                <a:solidFill>
-                  <a:srgbClr val="189A80"/>
-                </a:solidFill>
-                <a:latin typeface="Candara" panose="020E0502030303020204" pitchFamily="34" charset="0"/>
-              </a:rPr>
-              <a:t>Calcolo</a:t>
-            </a:r>
-            <a:r>
-              <a:rPr lang="en-US" sz="1600" b="1" dirty="0">
-                <a:solidFill>
-                  <a:srgbClr val="189A80"/>
-                </a:solidFill>
-                <a:latin typeface="Candara" panose="020E0502030303020204" pitchFamily="34" charset="0"/>
-              </a:rPr>
-              <a:t> actual support</a:t>
-            </a:r>
-            <a:endParaRPr lang="en-US" sz="1600" b="1" dirty="0">
-              <a:solidFill>
-                <a:srgbClr val="34738D"/>
-              </a:solidFill>
-              <a:latin typeface="Candara" panose="020E0502030303020204" pitchFamily="34" charset="0"/>
-            </a:endParaRPr>
-          </a:p>
-          <a:p>
-            <a:pPr algn="ctr" defTabSz="1219170">
-              <a:spcBef>
-                <a:spcPct val="20000"/>
-              </a:spcBef>
-              <a:defRPr/>
-            </a:pPr>
-            <a:r>
-              <a:rPr lang="en-US" sz="1200" dirty="0">
-                <a:solidFill>
-                  <a:schemeClr val="bg2">
-                    <a:lumMod val="10000"/>
-                  </a:schemeClr>
-                </a:solidFill>
-                <a:latin typeface="Candara" panose="020E0502030303020204" pitchFamily="34" charset="0"/>
-              </a:rPr>
-              <a:t>Il </a:t>
-            </a:r>
-            <a:r>
-              <a:rPr lang="en-US" sz="1200" dirty="0" err="1">
-                <a:solidFill>
-                  <a:schemeClr val="bg2">
-                    <a:lumMod val="10000"/>
-                  </a:schemeClr>
-                </a:solidFill>
-                <a:latin typeface="Candara" panose="020E0502030303020204" pitchFamily="34" charset="0"/>
-              </a:rPr>
-              <a:t>calcolo</a:t>
-            </a:r>
-            <a:r>
-              <a:rPr lang="en-US" sz="1200" dirty="0">
-                <a:solidFill>
-                  <a:schemeClr val="bg2">
-                    <a:lumMod val="10000"/>
-                  </a:schemeClr>
-                </a:solidFill>
-                <a:latin typeface="Candara" panose="020E0502030303020204" pitchFamily="34" charset="0"/>
-              </a:rPr>
-              <a:t> del support error non </a:t>
-            </a:r>
-            <a:r>
-              <a:rPr lang="en-US" sz="1200" dirty="0" err="1">
-                <a:solidFill>
-                  <a:schemeClr val="bg2">
-                    <a:lumMod val="10000"/>
-                  </a:schemeClr>
-                </a:solidFill>
-                <a:latin typeface="Candara" panose="020E0502030303020204" pitchFamily="34" charset="0"/>
-              </a:rPr>
-              <a:t>viene</a:t>
-            </a:r>
-            <a:r>
-              <a:rPr lang="en-US" sz="1200" dirty="0">
-                <a:solidFill>
-                  <a:schemeClr val="bg2">
-                    <a:lumMod val="10000"/>
-                  </a:schemeClr>
-                </a:solidFill>
-                <a:latin typeface="Candara" panose="020E0502030303020204" pitchFamily="34" charset="0"/>
-              </a:rPr>
-              <a:t> </a:t>
-            </a:r>
-            <a:r>
-              <a:rPr lang="en-US" sz="1200" dirty="0" err="1">
-                <a:solidFill>
-                  <a:schemeClr val="bg2">
-                    <a:lumMod val="10000"/>
-                  </a:schemeClr>
-                </a:solidFill>
-                <a:latin typeface="Candara" panose="020E0502030303020204" pitchFamily="34" charset="0"/>
-              </a:rPr>
-              <a:t>aggiornato</a:t>
-            </a:r>
-            <a:r>
-              <a:rPr lang="en-US" sz="1200" dirty="0">
-                <a:solidFill>
-                  <a:schemeClr val="bg2">
-                    <a:lumMod val="10000"/>
-                  </a:schemeClr>
-                </a:solidFill>
-                <a:latin typeface="Candara" panose="020E0502030303020204" pitchFamily="34" charset="0"/>
-              </a:rPr>
-              <a:t> per </a:t>
-            </a:r>
-            <a:r>
-              <a:rPr lang="en-US" sz="1200" dirty="0" err="1">
-                <a:solidFill>
-                  <a:schemeClr val="bg2">
-                    <a:lumMod val="10000"/>
-                  </a:schemeClr>
-                </a:solidFill>
-                <a:latin typeface="Candara" panose="020E0502030303020204" pitchFamily="34" charset="0"/>
-              </a:rPr>
-              <a:t>evitare</a:t>
-            </a:r>
-            <a:r>
-              <a:rPr lang="en-US" sz="1200" dirty="0">
-                <a:solidFill>
-                  <a:schemeClr val="bg2">
-                    <a:lumMod val="10000"/>
-                  </a:schemeClr>
-                </a:solidFill>
-                <a:latin typeface="Candara" panose="020E0502030303020204" pitchFamily="34" charset="0"/>
-              </a:rPr>
-              <a:t> una </a:t>
-            </a:r>
-            <a:r>
-              <a:rPr lang="en-US" sz="1200" dirty="0" err="1">
-                <a:solidFill>
-                  <a:schemeClr val="bg2">
-                    <a:lumMod val="10000"/>
-                  </a:schemeClr>
-                </a:solidFill>
-                <a:latin typeface="Candara" panose="020E0502030303020204" pitchFamily="34" charset="0"/>
-              </a:rPr>
-              <a:t>divisione</a:t>
-            </a:r>
-            <a:r>
-              <a:rPr lang="en-US" sz="1200" dirty="0">
-                <a:solidFill>
-                  <a:schemeClr val="bg2">
-                    <a:lumMod val="10000"/>
-                  </a:schemeClr>
-                </a:solidFill>
-                <a:latin typeface="Candara" panose="020E0502030303020204" pitchFamily="34" charset="0"/>
-              </a:rPr>
-              <a:t> per zero. </a:t>
-            </a:r>
-          </a:p>
-        </p:txBody>
-      </p:sp>
-      <p:sp>
-        <p:nvSpPr>
-          <p:cNvPr id="14" name="TextBox 25">
-            <a:extLst>
-              <a:ext uri="{FF2B5EF4-FFF2-40B4-BE49-F238E27FC236}">
-                <a16:creationId xmlns:a16="http://schemas.microsoft.com/office/drawing/2014/main" id="{0D4C3E5F-90E6-465D-B735-6FEC71763A9B}"/>
-              </a:ext>
-            </a:extLst>
-          </p:cNvPr>
-          <p:cNvSpPr txBox="1"/>
-          <p:nvPr/>
-        </p:nvSpPr>
-        <p:spPr>
-          <a:xfrm>
-            <a:off x="974127" y="2871864"/>
-            <a:ext cx="5256123" cy="744819"/>
-          </a:xfrm>
-          <a:prstGeom prst="rect">
-            <a:avLst/>
-          </a:prstGeom>
-          <a:noFill/>
-        </p:spPr>
-        <p:txBody>
-          <a:bodyPr wrap="square" rtlCol="0">
-            <a:spAutoFit/>
-          </a:bodyPr>
-          <a:lstStyle/>
-          <a:p>
-            <a:pPr algn="ctr" defTabSz="1219170">
-              <a:spcBef>
-                <a:spcPct val="20000"/>
-              </a:spcBef>
-              <a:defRPr/>
-            </a:pPr>
-            <a:r>
               <a:rPr lang="en-US" sz="1600" b="1" dirty="0">
                 <a:solidFill>
                   <a:srgbClr val="EF9D27"/>
@@ -16950,7 +17250,7 @@
         </p:nvSpPr>
         <p:spPr>
           <a:xfrm>
-            <a:off x="974127" y="3797592"/>
+            <a:off x="3795779" y="4202448"/>
             <a:ext cx="5256123" cy="929485"/>
           </a:xfrm>
           <a:prstGeom prst="rect">
@@ -17566,7 +17866,7 @@
         </p:nvSpPr>
         <p:spPr>
           <a:xfrm rot="2720395">
-            <a:off x="594413" y="4859277"/>
+            <a:off x="3416065" y="5264133"/>
             <a:ext cx="360000" cy="360000"/>
           </a:xfrm>
           <a:prstGeom prst="teardrop">
@@ -17625,7 +17925,7 @@
         </p:nvSpPr>
         <p:spPr>
           <a:xfrm>
-            <a:off x="974126" y="4666155"/>
+            <a:off x="3795778" y="5071011"/>
             <a:ext cx="5256123" cy="744819"/>
           </a:xfrm>
           <a:prstGeom prst="rect">

</xml_diff>